<commit_message>
setting up file structure
</commit_message>
<xml_diff>
--- a/Project2/Project2PPT.pptx
+++ b/Project2/Project2PPT.pptx
@@ -7691,19 +7691,7 @@
               <a:rPr lang="en-US" dirty="0" smtClean="0">
                 <a:latin typeface="+mj-lt"/>
               </a:rPr>
-              <a:t> model </a:t>
-            </a:r>
-            <a:r>
-              <a:rPr lang="en-US" dirty="0" smtClean="0">
-                <a:latin typeface="+mj-lt"/>
-              </a:rPr>
-              <a:t>is </a:t>
-            </a:r>
-            <a:r>
-              <a:rPr lang="en-US" dirty="0" smtClean="0">
-                <a:latin typeface="+mj-lt"/>
-              </a:rPr>
-              <a:t>more accurate</a:t>
+              <a:t> model is more accurate</a:t>
             </a:r>
           </a:p>
           <a:p>
@@ -7718,19 +7706,7 @@
               <a:rPr lang="en-US" dirty="0" smtClean="0">
                 <a:latin typeface="+mj-lt"/>
               </a:rPr>
-              <a:t>relatively </a:t>
-            </a:r>
-            <a:r>
-              <a:rPr lang="en-US" dirty="0" smtClean="0">
-                <a:latin typeface="+mj-lt"/>
-              </a:rPr>
-              <a:t>accurate until you get to super groups like the Beatles</a:t>
-            </a:r>
-            <a:r>
-              <a:rPr lang="en-US" dirty="0" smtClean="0">
-                <a:latin typeface="+mj-lt"/>
-              </a:rPr>
-              <a:t>.)</a:t>
+              <a:t>relatively accurate until you get to super groups like the Beatles.)</a:t>
             </a:r>
             <a:endParaRPr lang="en-US" dirty="0">
               <a:latin typeface="+mj-lt"/>

</xml_diff>